<commit_message>
add a new PPT
</commit_message>
<xml_diff>
--- a/Unix期末報告.pptx
+++ b/Unix期末報告.pptx
@@ -5525,7 +5525,30 @@
                 <a:latin typeface="標楷體" panose="03000509000000000000" pitchFamily="65" charset="-120"/>
                 <a:ea typeface="標楷體" panose="03000509000000000000" pitchFamily="65" charset="-120"/>
               </a:rPr>
-              <a:t>設計一個功能為可讀取文字檔並分析文章內容，並抓取其中可能的關鍵，且自動 進行關鍵字作</a:t>
+              <a:t>設計一個功能為可讀取文字檔並分析文章內容，抓取其中可能的關鍵句子，</a:t>
+            </a:r>
+            <a:endParaRPr lang="en-US" altLang="zh-TW" sz="2000" dirty="0">
+              <a:latin typeface="標楷體" panose="03000509000000000000" pitchFamily="65" charset="-120"/>
+              <a:ea typeface="標楷體" panose="03000509000000000000" pitchFamily="65" charset="-120"/>
+            </a:endParaRPr>
+          </a:p>
+          <a:p>
+            <a:pPr marL="0" indent="0">
+              <a:buNone/>
+            </a:pPr>
+            <a:r>
+              <a:rPr lang="en-US" altLang="zh-TW" sz="2000" dirty="0">
+                <a:latin typeface="標楷體" panose="03000509000000000000" pitchFamily="65" charset="-120"/>
+                <a:ea typeface="標楷體" panose="03000509000000000000" pitchFamily="65" charset="-120"/>
+              </a:rPr>
+              <a:t>	</a:t>
+            </a:r>
+            <a:r>
+              <a:rPr lang="zh-TW" altLang="en-US" sz="2000" dirty="0">
+                <a:latin typeface="標楷體" panose="03000509000000000000" pitchFamily="65" charset="-120"/>
+                <a:ea typeface="標楷體" panose="03000509000000000000" pitchFamily="65" charset="-120"/>
+              </a:rPr>
+              <a:t> 並自動進行關鍵字作</a:t>
             </a:r>
             <a:r>
               <a:rPr lang="en-US" altLang="zh-TW" sz="2000" dirty="0">
@@ -5561,26 +5584,8 @@
                 <a:latin typeface="標楷體" panose="03000509000000000000" pitchFamily="65" charset="-120"/>
                 <a:ea typeface="標楷體" panose="03000509000000000000" pitchFamily="65" charset="-120"/>
               </a:rPr>
-              <a:t>：Linux</a:t>
-            </a:r>
-            <a:r>
-              <a:rPr lang="en-US" altLang="zh-TW" dirty="0">
-                <a:latin typeface="標楷體" panose="03000509000000000000" pitchFamily="65" charset="-120"/>
-                <a:ea typeface="標楷體" panose="03000509000000000000" pitchFamily="65" charset="-120"/>
-              </a:rPr>
-              <a:t> </a:t>
-            </a:r>
-            <a:r>
-              <a:rPr lang="zh-TW" altLang="en-US" sz="2000" dirty="0">
-                <a:latin typeface="標楷體" panose="03000509000000000000" pitchFamily="65" charset="-120"/>
-                <a:ea typeface="標楷體" panose="03000509000000000000" pitchFamily="65" charset="-120"/>
-              </a:rPr>
-              <a:t>系統</a:t>
-            </a:r>
-            <a:endParaRPr lang="en-US" altLang="zh-TW" sz="2000" dirty="0">
-              <a:latin typeface="標楷體" panose="03000509000000000000" pitchFamily="65" charset="-120"/>
-              <a:ea typeface="標楷體" panose="03000509000000000000" pitchFamily="65" charset="-120"/>
-            </a:endParaRPr>
+              <a:t>：Ubuntu 16.04</a:t>
+            </a:r>
           </a:p>
           <a:p>
             <a:endParaRPr lang="en-US" altLang="zh-TW" sz="2000" dirty="0">
@@ -5615,7 +5620,7 @@
                 <a:latin typeface="標楷體" panose="03000509000000000000" pitchFamily="65" charset="-120"/>
                 <a:ea typeface="標楷體" panose="03000509000000000000" pitchFamily="65" charset="-120"/>
               </a:rPr>
-              <a:t>Linux Shell Script, Linux Google</a:t>
+              <a:t>Linux Shell Script, Linux Googler</a:t>
             </a:r>
             <a:r>
               <a:rPr lang="zh-TW" altLang="en-US" sz="2000" dirty="0">
@@ -6044,7 +6049,55 @@
                 <a:latin typeface="標楷體" panose="03000509000000000000" pitchFamily="65" charset="-120"/>
                 <a:ea typeface="標楷體" panose="03000509000000000000" pitchFamily="65" charset="-120"/>
               </a:rPr>
-              <a:t>在瀏覽英文文獻資料時往往難以抓出文章中的關鍵字，進而導致搜尋相關資料時的結果不如預期。因此，本專題想以分析並搜尋文字檔的應用作為主題，設計能夠找出字串或文章中的出現頻率高的字作為文章關鍵字，並自動進行</a:t>
+              <a:t>    在瀏覽英文文獻資料時往往難以抓出文章中的關鍵字，進而導致搜尋相</a:t>
+            </a:r>
+            <a:endParaRPr lang="en-US" altLang="zh-TW" sz="2000" dirty="0">
+              <a:latin typeface="標楷體" panose="03000509000000000000" pitchFamily="65" charset="-120"/>
+              <a:ea typeface="標楷體" panose="03000509000000000000" pitchFamily="65" charset="-120"/>
+            </a:endParaRPr>
+          </a:p>
+          <a:p>
+            <a:pPr marL="0" indent="0">
+              <a:buNone/>
+            </a:pPr>
+            <a:r>
+              <a:rPr lang="zh-TW" altLang="en-US" sz="2000" dirty="0">
+                <a:latin typeface="標楷體" panose="03000509000000000000" pitchFamily="65" charset="-120"/>
+                <a:ea typeface="標楷體" panose="03000509000000000000" pitchFamily="65" charset="-120"/>
+              </a:rPr>
+              <a:t>關資料時的結果不如預期。因此，本專題想以分析並搜尋文字檔的應用作為主</a:t>
+            </a:r>
+            <a:endParaRPr lang="en-US" altLang="zh-TW" sz="2000" dirty="0">
+              <a:latin typeface="標楷體" panose="03000509000000000000" pitchFamily="65" charset="-120"/>
+              <a:ea typeface="標楷體" panose="03000509000000000000" pitchFamily="65" charset="-120"/>
+            </a:endParaRPr>
+          </a:p>
+          <a:p>
+            <a:pPr marL="0" indent="0">
+              <a:buNone/>
+            </a:pPr>
+            <a:r>
+              <a:rPr lang="zh-TW" altLang="en-US" sz="2000" dirty="0">
+                <a:latin typeface="標楷體" panose="03000509000000000000" pitchFamily="65" charset="-120"/>
+                <a:ea typeface="標楷體" panose="03000509000000000000" pitchFamily="65" charset="-120"/>
+              </a:rPr>
+              <a:t>題，設計能夠找出字串或文章中的出現頻率高的字作為文章關鍵字，並自動進</a:t>
+            </a:r>
+            <a:endParaRPr lang="en-US" altLang="zh-TW" sz="2000" dirty="0">
+              <a:latin typeface="標楷體" panose="03000509000000000000" pitchFamily="65" charset="-120"/>
+              <a:ea typeface="標楷體" panose="03000509000000000000" pitchFamily="65" charset="-120"/>
+            </a:endParaRPr>
+          </a:p>
+          <a:p>
+            <a:pPr marL="0" indent="0">
+              <a:buNone/>
+            </a:pPr>
+            <a:r>
+              <a:rPr lang="zh-TW" altLang="en-US" sz="2000" dirty="0">
+                <a:latin typeface="標楷體" panose="03000509000000000000" pitchFamily="65" charset="-120"/>
+                <a:ea typeface="標楷體" panose="03000509000000000000" pitchFamily="65" charset="-120"/>
+              </a:rPr>
+              <a:t>行</a:t>
             </a:r>
             <a:r>
               <a:rPr lang="en-US" altLang="zh-TW" sz="2000" dirty="0">
@@ -6343,7 +6396,7 @@
         <p:spPr>
           <a:xfrm>
             <a:off x="422030" y="1561514"/>
-            <a:ext cx="8693834" cy="1292662"/>
+            <a:ext cx="8693834" cy="1908215"/>
           </a:xfrm>
           <a:prstGeom prst="rect">
             <a:avLst/>
@@ -6361,7 +6414,7 @@
                 <a:latin typeface="標楷體" panose="03000509000000000000" pitchFamily="65" charset="-120"/>
                 <a:ea typeface="標楷體" panose="03000509000000000000" pitchFamily="65" charset="-120"/>
               </a:rPr>
-              <a:t>能夠應用於短時間內搜尋多個關鍵字</a:t>
+              <a:t>    能夠應用於短時間內搜尋多個關鍵字</a:t>
             </a:r>
             <a:r>
               <a:rPr lang="en-US" altLang="zh-TW" sz="2000" dirty="0">
@@ -6389,7 +6442,26 @@
                 <a:latin typeface="標楷體" panose="03000509000000000000" pitchFamily="65" charset="-120"/>
                 <a:ea typeface="標楷體" panose="03000509000000000000" pitchFamily="65" charset="-120"/>
               </a:rPr>
-              <a:t>並一次搜尋多筆資料，同時呈現使用者其</a:t>
+              <a:t>並一次搜尋多筆</a:t>
+            </a:r>
+            <a:endParaRPr lang="en-US" altLang="zh-TW" sz="2000" dirty="0">
+              <a:latin typeface="標楷體" panose="03000509000000000000" pitchFamily="65" charset="-120"/>
+              <a:ea typeface="標楷體" panose="03000509000000000000" pitchFamily="65" charset="-120"/>
+            </a:endParaRPr>
+          </a:p>
+          <a:p>
+            <a:endParaRPr lang="en-US" altLang="zh-TW" sz="2000" dirty="0">
+              <a:latin typeface="標楷體" panose="03000509000000000000" pitchFamily="65" charset="-120"/>
+              <a:ea typeface="標楷體" panose="03000509000000000000" pitchFamily="65" charset="-120"/>
+            </a:endParaRPr>
+          </a:p>
+          <a:p>
+            <a:r>
+              <a:rPr lang="zh-TW" altLang="en-US" sz="2000" dirty="0">
+                <a:latin typeface="標楷體" panose="03000509000000000000" pitchFamily="65" charset="-120"/>
+                <a:ea typeface="標楷體" panose="03000509000000000000" pitchFamily="65" charset="-120"/>
+              </a:rPr>
+              <a:t>資料，同時呈現使用者其</a:t>
             </a:r>
             <a:r>
               <a:rPr lang="en-US" altLang="zh-TW" sz="2000" dirty="0">
@@ -6403,7 +6475,26 @@
                 <a:latin typeface="標楷體" panose="03000509000000000000" pitchFamily="65" charset="-120"/>
                 <a:ea typeface="標楷體" panose="03000509000000000000" pitchFamily="65" charset="-120"/>
               </a:rPr>
-              <a:t>搜尋結果，讓使用者免去了一項一項搜尋、比較的麻煩。</a:t>
+              <a:t>搜尋結果，讓使用者免去了一項一項搜尋、</a:t>
+            </a:r>
+            <a:endParaRPr lang="en-US" altLang="zh-TW" sz="2000" dirty="0">
+              <a:latin typeface="標楷體" panose="03000509000000000000" pitchFamily="65" charset="-120"/>
+              <a:ea typeface="標楷體" panose="03000509000000000000" pitchFamily="65" charset="-120"/>
+            </a:endParaRPr>
+          </a:p>
+          <a:p>
+            <a:endParaRPr lang="en-US" altLang="zh-TW" sz="2000" dirty="0">
+              <a:latin typeface="標楷體" panose="03000509000000000000" pitchFamily="65" charset="-120"/>
+              <a:ea typeface="標楷體" panose="03000509000000000000" pitchFamily="65" charset="-120"/>
+            </a:endParaRPr>
+          </a:p>
+          <a:p>
+            <a:r>
+              <a:rPr lang="zh-TW" altLang="en-US" sz="2000" dirty="0">
+                <a:latin typeface="標楷體" panose="03000509000000000000" pitchFamily="65" charset="-120"/>
+                <a:ea typeface="標楷體" panose="03000509000000000000" pitchFamily="65" charset="-120"/>
+              </a:rPr>
+              <a:t>比較的麻煩。</a:t>
             </a:r>
           </a:p>
           <a:p>
@@ -7003,10 +7094,10 @@
       </p:grpSp>
       <p:pic>
         <p:nvPicPr>
-          <p:cNvPr id="2058" name="Picture 10" descr="C:\Users\USER\AppData\Local\Temp\ksohtml\wps_clip_image-24616.png">
+          <p:cNvPr id="1026" name="Picture 2" descr="C:\Users\USER\AppData\Local\Temp\ksohtml\wps_clip_image-11739.png">
             <a:extLst>
               <a:ext uri="{FF2B5EF4-FFF2-40B4-BE49-F238E27FC236}">
-                <a16:creationId xmlns:a16="http://schemas.microsoft.com/office/drawing/2014/main" id="{06680B3F-5C8D-400B-8A44-A2D689ACE28B}"/>
+                <a16:creationId xmlns:a16="http://schemas.microsoft.com/office/drawing/2014/main" id="{41D59866-1017-43D9-8564-8545AE00C1CC}"/>
               </a:ext>
             </a:extLst>
           </p:cNvPr>
@@ -7030,8 +7121,8 @@
         </p:blipFill>
         <p:spPr bwMode="auto">
           <a:xfrm>
-            <a:off x="4980717" y="3785936"/>
-            <a:ext cx="1538068" cy="1087902"/>
+            <a:off x="4942449" y="3792024"/>
+            <a:ext cx="1612320" cy="1140424"/>
           </a:xfrm>
           <a:prstGeom prst="rect">
             <a:avLst/>

</xml_diff>